<commit_message>
update architecture that move the Action and Conditions out of Entities category because it's detail of application
</commit_message>
<xml_diff>
--- a/specification/Architecture.pptx
+++ b/specification/Architecture.pptx
@@ -6,6 +6,7 @@
   </p:sldMasterIdLst>
   <p:sldIdLst>
     <p:sldId id="256" r:id="rId2"/>
+    <p:sldId id="257" r:id="rId3"/>
   </p:sldIdLst>
   <p:sldSz cx="12192000" cy="6858000"/>
   <p:notesSz cx="6858000" cy="9144000"/>
@@ -3340,8 +3341,8 @@
         </p:nvSpPr>
         <p:spPr>
           <a:xfrm>
-            <a:off x="9672670" y="926592"/>
-            <a:ext cx="1565306" cy="600456"/>
+            <a:off x="67473" y="5601899"/>
+            <a:ext cx="1681143" cy="600456"/>
           </a:xfrm>
           <a:prstGeom prst="rect">
             <a:avLst/>
@@ -3430,65 +3431,6 @@
       </p:cxnSp>
       <p:sp>
         <p:nvSpPr>
-          <p:cNvPr id="8" name="Rectangle 7">
-            <a:extLst>
-              <a:ext uri="{FF2B5EF4-FFF2-40B4-BE49-F238E27FC236}">
-                <a16:creationId xmlns:a16="http://schemas.microsoft.com/office/drawing/2014/main" id="{1BD6DB10-DBC2-2240-A4D5-60A422382128}"/>
-              </a:ext>
-            </a:extLst>
-          </p:cNvPr>
-          <p:cNvSpPr/>
-          <p:nvPr/>
-        </p:nvSpPr>
-        <p:spPr>
-          <a:xfrm>
-            <a:off x="9672670" y="1691640"/>
-            <a:ext cx="1565306" cy="600456"/>
-          </a:xfrm>
-          <a:prstGeom prst="rect">
-            <a:avLst/>
-          </a:prstGeom>
-          <a:solidFill>
-            <a:schemeClr val="accent1">
-              <a:lumMod val="20000"/>
-              <a:lumOff val="80000"/>
-            </a:schemeClr>
-          </a:solidFill>
-        </p:spPr>
-        <p:style>
-          <a:lnRef idx="2">
-            <a:schemeClr val="accent1">
-              <a:shade val="50000"/>
-            </a:schemeClr>
-          </a:lnRef>
-          <a:fillRef idx="1">
-            <a:schemeClr val="accent1"/>
-          </a:fillRef>
-          <a:effectRef idx="0">
-            <a:schemeClr val="accent1"/>
-          </a:effectRef>
-          <a:fontRef idx="minor">
-            <a:schemeClr val="lt1"/>
-          </a:fontRef>
-        </p:style>
-        <p:txBody>
-          <a:bodyPr rtlCol="0" anchor="ctr"/>
-          <a:lstStyle/>
-          <a:p>
-            <a:pPr algn="ctr"/>
-            <a:r>
-              <a:rPr lang="en-US" dirty="0">
-                <a:solidFill>
-                  <a:schemeClr val="tx1"/>
-                </a:solidFill>
-              </a:rPr>
-              <a:t>Conditions</a:t>
-            </a:r>
-          </a:p>
-        </p:txBody>
-      </p:sp>
-      <p:sp>
-        <p:nvSpPr>
           <p:cNvPr id="9" name="Rectangle 8">
             <a:extLst>
               <a:ext uri="{FF2B5EF4-FFF2-40B4-BE49-F238E27FC236}">
@@ -3650,97 +3592,6 @@
       </p:sp>
       <p:cxnSp>
         <p:nvCxnSpPr>
-          <p:cNvPr id="17" name="Elbow Connector 16">
-            <a:extLst>
-              <a:ext uri="{FF2B5EF4-FFF2-40B4-BE49-F238E27FC236}">
-                <a16:creationId xmlns:a16="http://schemas.microsoft.com/office/drawing/2014/main" id="{EFC40753-EA13-EA46-8D13-5D41C0ADA4B4}"/>
-              </a:ext>
-            </a:extLst>
-          </p:cNvPr>
-          <p:cNvCxnSpPr>
-            <a:stCxn id="15" idx="3"/>
-            <a:endCxn id="4" idx="1"/>
-          </p:cNvCxnSpPr>
-          <p:nvPr/>
-        </p:nvCxnSpPr>
-        <p:spPr>
-          <a:xfrm flipV="1">
-            <a:off x="8097013" y="1226820"/>
-            <a:ext cx="1575657" cy="1594104"/>
-          </a:xfrm>
-          <a:prstGeom prst="bentConnector3">
-            <a:avLst/>
-          </a:prstGeom>
-          <a:ln>
-            <a:solidFill>
-              <a:schemeClr val="tx1"/>
-            </a:solidFill>
-            <a:tailEnd type="triangle"/>
-          </a:ln>
-        </p:spPr>
-        <p:style>
-          <a:lnRef idx="1">
-            <a:schemeClr val="accent1"/>
-          </a:lnRef>
-          <a:fillRef idx="0">
-            <a:schemeClr val="accent1"/>
-          </a:fillRef>
-          <a:effectRef idx="0">
-            <a:schemeClr val="accent1"/>
-          </a:effectRef>
-          <a:fontRef idx="minor">
-            <a:schemeClr val="tx1"/>
-          </a:fontRef>
-        </p:style>
-      </p:cxnSp>
-      <p:cxnSp>
-        <p:nvCxnSpPr>
-          <p:cNvPr id="18" name="Elbow Connector 17">
-            <a:extLst>
-              <a:ext uri="{FF2B5EF4-FFF2-40B4-BE49-F238E27FC236}">
-                <a16:creationId xmlns:a16="http://schemas.microsoft.com/office/drawing/2014/main" id="{3F8218FB-0951-F74A-9CE0-815E7FCA4E31}"/>
-              </a:ext>
-            </a:extLst>
-          </p:cNvPr>
-          <p:cNvCxnSpPr>
-            <a:cxnSpLocks/>
-            <a:stCxn id="15" idx="3"/>
-            <a:endCxn id="8" idx="1"/>
-          </p:cNvCxnSpPr>
-          <p:nvPr/>
-        </p:nvCxnSpPr>
-        <p:spPr>
-          <a:xfrm flipV="1">
-            <a:off x="8097013" y="1991868"/>
-            <a:ext cx="1575657" cy="829056"/>
-          </a:xfrm>
-          <a:prstGeom prst="bentConnector3">
-            <a:avLst/>
-          </a:prstGeom>
-          <a:ln>
-            <a:solidFill>
-              <a:schemeClr val="tx1"/>
-            </a:solidFill>
-            <a:tailEnd type="triangle"/>
-          </a:ln>
-        </p:spPr>
-        <p:style>
-          <a:lnRef idx="1">
-            <a:schemeClr val="accent1"/>
-          </a:lnRef>
-          <a:fillRef idx="0">
-            <a:schemeClr val="accent1"/>
-          </a:fillRef>
-          <a:effectRef idx="0">
-            <a:schemeClr val="accent1"/>
-          </a:effectRef>
-          <a:fontRef idx="minor">
-            <a:schemeClr val="tx1"/>
-          </a:fontRef>
-        </p:style>
-      </p:cxnSp>
-      <p:cxnSp>
-        <p:nvCxnSpPr>
           <p:cNvPr id="25" name="Straight Arrow Connector 24">
             <a:extLst>
               <a:ext uri="{FF2B5EF4-FFF2-40B4-BE49-F238E27FC236}">
@@ -4865,9 +4716,9 @@
           <p:nvPr/>
         </p:nvCxnSpPr>
         <p:spPr>
-          <a:xfrm>
-            <a:off x="3896009" y="81685"/>
-            <a:ext cx="0" cy="6493092"/>
+          <a:xfrm flipH="1">
+            <a:off x="3896007" y="81685"/>
+            <a:ext cx="2" cy="5266871"/>
           </a:xfrm>
           <a:prstGeom prst="line">
             <a:avLst/>
@@ -4907,7 +4758,7 @@
         </p:nvSpPr>
         <p:spPr>
           <a:xfrm>
-            <a:off x="6531707" y="4650159"/>
+            <a:off x="8275472" y="4578207"/>
             <a:ext cx="1565306" cy="600456"/>
           </a:xfrm>
           <a:prstGeom prst="rect">
@@ -5890,52 +5741,6 @@
           </a:fontRef>
         </p:style>
       </p:cxnSp>
-      <p:cxnSp>
-        <p:nvCxnSpPr>
-          <p:cNvPr id="93" name="Straight Arrow Connector 92">
-            <a:extLst>
-              <a:ext uri="{FF2B5EF4-FFF2-40B4-BE49-F238E27FC236}">
-                <a16:creationId xmlns:a16="http://schemas.microsoft.com/office/drawing/2014/main" id="{E8778D4C-8683-2D43-83F7-9153CE761E0D}"/>
-              </a:ext>
-            </a:extLst>
-          </p:cNvPr>
-          <p:cNvCxnSpPr>
-            <a:cxnSpLocks/>
-            <a:stCxn id="15" idx="2"/>
-            <a:endCxn id="49" idx="0"/>
-          </p:cNvCxnSpPr>
-          <p:nvPr/>
-        </p:nvCxnSpPr>
-        <p:spPr>
-          <a:xfrm>
-            <a:off x="7314360" y="3121152"/>
-            <a:ext cx="0" cy="1529007"/>
-          </a:xfrm>
-          <a:prstGeom prst="straightConnector1">
-            <a:avLst/>
-          </a:prstGeom>
-          <a:ln>
-            <a:solidFill>
-              <a:schemeClr val="tx1"/>
-            </a:solidFill>
-            <a:tailEnd type="triangle"/>
-          </a:ln>
-        </p:spPr>
-        <p:style>
-          <a:lnRef idx="1">
-            <a:schemeClr val="accent1"/>
-          </a:lnRef>
-          <a:fillRef idx="0">
-            <a:schemeClr val="accent1"/>
-          </a:fillRef>
-          <a:effectRef idx="0">
-            <a:schemeClr val="accent1"/>
-          </a:effectRef>
-          <a:fontRef idx="minor">
-            <a:schemeClr val="tx1"/>
-          </a:fontRef>
-        </p:style>
-      </p:cxnSp>
       <p:sp>
         <p:nvSpPr>
           <p:cNvPr id="96" name="Rectangle 95">
@@ -5950,7 +5755,7 @@
         </p:nvSpPr>
         <p:spPr>
           <a:xfrm>
-            <a:off x="6536280" y="5677614"/>
+            <a:off x="8280045" y="5605662"/>
             <a:ext cx="1565306" cy="600456"/>
           </a:xfrm>
           <a:prstGeom prst="rect">
@@ -6025,7 +5830,7 @@
         </p:nvSpPr>
         <p:spPr>
           <a:xfrm>
-            <a:off x="8771987" y="5677614"/>
+            <a:off x="10515752" y="5605662"/>
             <a:ext cx="1565306" cy="600456"/>
           </a:xfrm>
           <a:prstGeom prst="rect">
@@ -6086,7 +5891,7 @@
         </p:nvCxnSpPr>
         <p:spPr>
           <a:xfrm flipH="1">
-            <a:off x="3896009" y="5422392"/>
+            <a:off x="3841496" y="5348556"/>
             <a:ext cx="8295992" cy="0"/>
           </a:xfrm>
           <a:prstGeom prst="line">
@@ -6131,7 +5936,7 @@
         </p:nvCxnSpPr>
         <p:spPr>
           <a:xfrm flipH="1" flipV="1">
-            <a:off x="7314360" y="5250615"/>
+            <a:off x="9058125" y="5178663"/>
             <a:ext cx="4573" cy="426999"/>
           </a:xfrm>
           <a:prstGeom prst="straightConnector1">
@@ -6177,8 +5982,8 @@
         </p:nvCxnSpPr>
         <p:spPr>
           <a:xfrm flipV="1">
-            <a:off x="8097013" y="3121152"/>
-            <a:ext cx="2358310" cy="1829235"/>
+            <a:off x="9840778" y="3121152"/>
+            <a:ext cx="614545" cy="1757283"/>
           </a:xfrm>
           <a:prstGeom prst="bentConnector2">
             <a:avLst/>
@@ -6223,7 +6028,7 @@
         </p:nvCxnSpPr>
         <p:spPr>
           <a:xfrm>
-            <a:off x="8101586" y="5977842"/>
+            <a:off x="9845351" y="5905890"/>
             <a:ext cx="670401" cy="0"/>
           </a:xfrm>
           <a:prstGeom prst="straightConnector1">
@@ -6455,7 +6260,7 @@
         </p:nvSpPr>
         <p:spPr>
           <a:xfrm>
-            <a:off x="3912745" y="5152969"/>
+            <a:off x="10402627" y="5024303"/>
             <a:ext cx="2361336" cy="369332"/>
           </a:xfrm>
           <a:prstGeom prst="rect">
@@ -6519,10 +6324,509 @@
           </a:p>
         </p:txBody>
       </p:sp>
+      <p:sp>
+        <p:nvSpPr>
+          <p:cNvPr id="73" name="Rectangle 72">
+            <a:extLst>
+              <a:ext uri="{FF2B5EF4-FFF2-40B4-BE49-F238E27FC236}">
+                <a16:creationId xmlns:a16="http://schemas.microsoft.com/office/drawing/2014/main" id="{7EF8F8FB-4B7E-6246-B4F2-73688C467F7B}"/>
+              </a:ext>
+            </a:extLst>
+          </p:cNvPr>
+          <p:cNvSpPr/>
+          <p:nvPr/>
+        </p:nvSpPr>
+        <p:spPr>
+          <a:xfrm>
+            <a:off x="6527347" y="4566527"/>
+            <a:ext cx="1565306" cy="600456"/>
+          </a:xfrm>
+          <a:prstGeom prst="rect">
+            <a:avLst/>
+          </a:prstGeom>
+          <a:solidFill>
+            <a:schemeClr val="accent1">
+              <a:lumMod val="20000"/>
+              <a:lumOff val="80000"/>
+            </a:schemeClr>
+          </a:solidFill>
+        </p:spPr>
+        <p:style>
+          <a:lnRef idx="2">
+            <a:schemeClr val="accent1">
+              <a:shade val="50000"/>
+            </a:schemeClr>
+          </a:lnRef>
+          <a:fillRef idx="1">
+            <a:schemeClr val="accent1"/>
+          </a:fillRef>
+          <a:effectRef idx="0">
+            <a:schemeClr val="accent1"/>
+          </a:effectRef>
+          <a:fontRef idx="minor">
+            <a:schemeClr val="lt1"/>
+          </a:fontRef>
+        </p:style>
+        <p:txBody>
+          <a:bodyPr rtlCol="0" anchor="ctr"/>
+          <a:lstStyle/>
+          <a:p>
+            <a:pPr algn="ctr"/>
+            <a:r>
+              <a:rPr lang="en-US" dirty="0">
+                <a:solidFill>
+                  <a:schemeClr val="tx1"/>
+                </a:solidFill>
+              </a:rPr>
+              <a:t>Action Interface &lt;I&gt;</a:t>
+            </a:r>
+          </a:p>
+        </p:txBody>
+      </p:sp>
+      <p:cxnSp>
+        <p:nvCxnSpPr>
+          <p:cNvPr id="74" name="Elbow Connector 73">
+            <a:extLst>
+              <a:ext uri="{FF2B5EF4-FFF2-40B4-BE49-F238E27FC236}">
+                <a16:creationId xmlns:a16="http://schemas.microsoft.com/office/drawing/2014/main" id="{3F0373DA-DA58-3B45-AF1F-B34DA266FFFE}"/>
+              </a:ext>
+            </a:extLst>
+          </p:cNvPr>
+          <p:cNvCxnSpPr>
+            <a:cxnSpLocks/>
+            <a:stCxn id="15" idx="2"/>
+            <a:endCxn id="49" idx="0"/>
+          </p:cNvCxnSpPr>
+          <p:nvPr/>
+        </p:nvCxnSpPr>
+        <p:spPr>
+          <a:xfrm rot="16200000" flipH="1">
+            <a:off x="7457715" y="2977796"/>
+            <a:ext cx="1457055" cy="1743765"/>
+          </a:xfrm>
+          <a:prstGeom prst="bentConnector3">
+            <a:avLst>
+              <a:gd name="adj1" fmla="val 50000"/>
+            </a:avLst>
+          </a:prstGeom>
+          <a:ln>
+            <a:solidFill>
+              <a:schemeClr val="tx1"/>
+            </a:solidFill>
+            <a:tailEnd type="triangle"/>
+          </a:ln>
+        </p:spPr>
+        <p:style>
+          <a:lnRef idx="1">
+            <a:schemeClr val="accent1"/>
+          </a:lnRef>
+          <a:fillRef idx="0">
+            <a:schemeClr val="accent1"/>
+          </a:fillRef>
+          <a:effectRef idx="0">
+            <a:schemeClr val="accent1"/>
+          </a:effectRef>
+          <a:fontRef idx="minor">
+            <a:schemeClr val="tx1"/>
+          </a:fontRef>
+        </p:style>
+      </p:cxnSp>
+      <p:cxnSp>
+        <p:nvCxnSpPr>
+          <p:cNvPr id="77" name="Straight Arrow Connector 76">
+            <a:extLst>
+              <a:ext uri="{FF2B5EF4-FFF2-40B4-BE49-F238E27FC236}">
+                <a16:creationId xmlns:a16="http://schemas.microsoft.com/office/drawing/2014/main" id="{02886BEF-A35E-524B-92B9-3AF2E7934B05}"/>
+              </a:ext>
+            </a:extLst>
+          </p:cNvPr>
+          <p:cNvCxnSpPr>
+            <a:cxnSpLocks/>
+            <a:stCxn id="15" idx="2"/>
+            <a:endCxn id="73" idx="0"/>
+          </p:cNvCxnSpPr>
+          <p:nvPr/>
+        </p:nvCxnSpPr>
+        <p:spPr>
+          <a:xfrm flipH="1">
+            <a:off x="7310000" y="3121152"/>
+            <a:ext cx="4360" cy="1445375"/>
+          </a:xfrm>
+          <a:prstGeom prst="straightConnector1">
+            <a:avLst/>
+          </a:prstGeom>
+          <a:ln>
+            <a:solidFill>
+              <a:schemeClr val="tx1"/>
+            </a:solidFill>
+            <a:tailEnd type="triangle"/>
+          </a:ln>
+        </p:spPr>
+        <p:style>
+          <a:lnRef idx="1">
+            <a:schemeClr val="accent1"/>
+          </a:lnRef>
+          <a:fillRef idx="0">
+            <a:schemeClr val="accent1"/>
+          </a:fillRef>
+          <a:effectRef idx="0">
+            <a:schemeClr val="accent1"/>
+          </a:effectRef>
+          <a:fontRef idx="minor">
+            <a:schemeClr val="tx1"/>
+          </a:fontRef>
+        </p:style>
+      </p:cxnSp>
+      <p:sp>
+        <p:nvSpPr>
+          <p:cNvPr id="81" name="TextBox 80">
+            <a:extLst>
+              <a:ext uri="{FF2B5EF4-FFF2-40B4-BE49-F238E27FC236}">
+                <a16:creationId xmlns:a16="http://schemas.microsoft.com/office/drawing/2014/main" id="{D1E91946-1C19-BE4F-BF79-9FDE7073DD45}"/>
+              </a:ext>
+            </a:extLst>
+          </p:cNvPr>
+          <p:cNvSpPr txBox="1"/>
+          <p:nvPr/>
+        </p:nvSpPr>
+        <p:spPr>
+          <a:xfrm>
+            <a:off x="1175595" y="5968973"/>
+            <a:ext cx="573979" cy="246221"/>
+          </a:xfrm>
+          <a:prstGeom prst="rect">
+            <a:avLst/>
+          </a:prstGeom>
+          <a:noFill/>
+        </p:spPr>
+        <p:txBody>
+          <a:bodyPr wrap="square" rtlCol="0">
+            <a:spAutoFit/>
+          </a:bodyPr>
+          <a:lstStyle/>
+          <a:p>
+            <a:r>
+              <a:rPr lang="en-US" sz="1000" dirty="0"/>
+              <a:t>&lt;</a:t>
+            </a:r>
+            <a:r>
+              <a:rPr lang="en-US" sz="1000" dirty="0" err="1"/>
+              <a:t>Impl</a:t>
+            </a:r>
+            <a:r>
+              <a:rPr lang="en-US" sz="1000" dirty="0"/>
+              <a:t>&gt;</a:t>
+            </a:r>
+          </a:p>
+        </p:txBody>
+      </p:sp>
+      <p:cxnSp>
+        <p:nvCxnSpPr>
+          <p:cNvPr id="82" name="Elbow Connector 81">
+            <a:extLst>
+              <a:ext uri="{FF2B5EF4-FFF2-40B4-BE49-F238E27FC236}">
+                <a16:creationId xmlns:a16="http://schemas.microsoft.com/office/drawing/2014/main" id="{84D49719-36B4-114B-B907-2223B025E149}"/>
+              </a:ext>
+            </a:extLst>
+          </p:cNvPr>
+          <p:cNvCxnSpPr>
+            <a:cxnSpLocks/>
+            <a:stCxn id="4" idx="3"/>
+            <a:endCxn id="73" idx="2"/>
+          </p:cNvCxnSpPr>
+          <p:nvPr/>
+        </p:nvCxnSpPr>
+        <p:spPr>
+          <a:xfrm flipV="1">
+            <a:off x="1748616" y="5166983"/>
+            <a:ext cx="5561384" cy="735144"/>
+          </a:xfrm>
+          <a:prstGeom prst="bentConnector2">
+            <a:avLst/>
+          </a:prstGeom>
+          <a:ln>
+            <a:solidFill>
+              <a:schemeClr val="tx1"/>
+            </a:solidFill>
+            <a:tailEnd type="triangle"/>
+          </a:ln>
+        </p:spPr>
+        <p:style>
+          <a:lnRef idx="1">
+            <a:schemeClr val="accent1"/>
+          </a:lnRef>
+          <a:fillRef idx="0">
+            <a:schemeClr val="accent1"/>
+          </a:fillRef>
+          <a:effectRef idx="0">
+            <a:schemeClr val="accent1"/>
+          </a:effectRef>
+          <a:fontRef idx="minor">
+            <a:schemeClr val="tx1"/>
+          </a:fontRef>
+        </p:style>
+      </p:cxnSp>
     </p:spTree>
     <p:extLst>
       <p:ext uri="{BB962C8B-B14F-4D97-AF65-F5344CB8AC3E}">
         <p14:creationId xmlns:p14="http://schemas.microsoft.com/office/powerpoint/2010/main" val="1021045416"/>
+      </p:ext>
+    </p:extLst>
+  </p:cSld>
+  <p:clrMapOvr>
+    <a:masterClrMapping/>
+  </p:clrMapOvr>
+</p:sld>
+</file>
+
+<file path=ppt/slides/slide2.xml><?xml version="1.0" encoding="utf-8"?>
+<p:sld xmlns:a="http://schemas.openxmlformats.org/drawingml/2006/main" xmlns:r="http://schemas.openxmlformats.org/officeDocument/2006/relationships" xmlns:p="http://schemas.openxmlformats.org/presentationml/2006/main">
+  <p:cSld>
+    <p:spTree>
+      <p:nvGrpSpPr>
+        <p:cNvPr id="1" name=""/>
+        <p:cNvGrpSpPr/>
+        <p:nvPr/>
+      </p:nvGrpSpPr>
+      <p:grpSpPr>
+        <a:xfrm>
+          <a:off x="0" y="0"/>
+          <a:ext cx="0" cy="0"/>
+          <a:chOff x="0" y="0"/>
+          <a:chExt cx="0" cy="0"/>
+        </a:xfrm>
+      </p:grpSpPr>
+      <p:sp>
+        <p:nvSpPr>
+          <p:cNvPr id="2" name="Title 1">
+            <a:extLst>
+              <a:ext uri="{FF2B5EF4-FFF2-40B4-BE49-F238E27FC236}">
+                <a16:creationId xmlns:a16="http://schemas.microsoft.com/office/drawing/2014/main" id="{FB0675CC-98B0-B249-89B5-60C4B65F1C5C}"/>
+              </a:ext>
+            </a:extLst>
+          </p:cNvPr>
+          <p:cNvSpPr>
+            <a:spLocks noGrp="1"/>
+          </p:cNvSpPr>
+          <p:nvPr>
+            <p:ph type="title"/>
+          </p:nvPr>
+        </p:nvSpPr>
+        <p:spPr/>
+        <p:txBody>
+          <a:bodyPr/>
+          <a:lstStyle/>
+          <a:p>
+            <a:r>
+              <a:rPr lang="en-US" dirty="0"/>
+              <a:t>Sensor Entity</a:t>
+            </a:r>
+          </a:p>
+        </p:txBody>
+      </p:sp>
+      <p:sp>
+        <p:nvSpPr>
+          <p:cNvPr id="3" name="Content Placeholder 2">
+            <a:extLst>
+              <a:ext uri="{FF2B5EF4-FFF2-40B4-BE49-F238E27FC236}">
+                <a16:creationId xmlns:a16="http://schemas.microsoft.com/office/drawing/2014/main" id="{A917577D-C35B-454A-8C6C-8303D0AA4D6A}"/>
+              </a:ext>
+            </a:extLst>
+          </p:cNvPr>
+          <p:cNvSpPr>
+            <a:spLocks noGrp="1"/>
+          </p:cNvSpPr>
+          <p:nvPr>
+            <p:ph idx="1"/>
+          </p:nvPr>
+        </p:nvSpPr>
+        <p:spPr>
+          <a:xfrm>
+            <a:off x="838200" y="1825625"/>
+            <a:ext cx="10515600" cy="3459607"/>
+          </a:xfrm>
+        </p:spPr>
+        <p:txBody>
+          <a:bodyPr>
+            <a:normAutofit fontScale="77500" lnSpcReduction="20000"/>
+          </a:bodyPr>
+          <a:lstStyle/>
+          <a:p>
+            <a:r>
+              <a:rPr lang="en-US" dirty="0"/>
+              <a:t>Data: </a:t>
+            </a:r>
+          </a:p>
+          <a:p>
+            <a:pPr lvl="1"/>
+            <a:r>
+              <a:rPr lang="en-US" dirty="0"/>
+              <a:t>Type:</a:t>
+            </a:r>
+          </a:p>
+          <a:p>
+            <a:pPr lvl="2"/>
+            <a:r>
+              <a:rPr lang="en-US" dirty="0" err="1"/>
+              <a:t>dataType</a:t>
+            </a:r>
+            <a:r>
+              <a:rPr lang="en-US" dirty="0"/>
+              <a:t>: string, </a:t>
+            </a:r>
+            <a:r>
+              <a:rPr lang="en-US" dirty="0" err="1"/>
+              <a:t>valueSpace</a:t>
+            </a:r>
+            <a:r>
+              <a:rPr lang="en-US" dirty="0"/>
+              <a:t>: </a:t>
+            </a:r>
+            <a:r>
+              <a:rPr lang="en-US" dirty="0" err="1"/>
+              <a:t>enum</a:t>
+            </a:r>
+            <a:r>
+              <a:rPr lang="en-US" dirty="0"/>
+              <a:t>[PM1.0,PM2.5,PM10.0]</a:t>
+            </a:r>
+          </a:p>
+          <a:p>
+            <a:pPr lvl="1"/>
+            <a:r>
+              <a:rPr lang="en-US" dirty="0"/>
+              <a:t>Unit: ug/m3</a:t>
+            </a:r>
+          </a:p>
+          <a:p>
+            <a:pPr lvl="2"/>
+            <a:r>
+              <a:rPr lang="en-US" dirty="0"/>
+              <a:t>datatype: string, </a:t>
+            </a:r>
+            <a:r>
+              <a:rPr lang="en-US" dirty="0" err="1"/>
+              <a:t>valueSpace</a:t>
+            </a:r>
+            <a:r>
+              <a:rPr lang="en-US" dirty="0"/>
+              <a:t>: ug/m3</a:t>
+            </a:r>
+          </a:p>
+          <a:p>
+            <a:pPr lvl="1"/>
+            <a:r>
+              <a:rPr lang="en-US" dirty="0"/>
+              <a:t>Value: 20.1</a:t>
+            </a:r>
+          </a:p>
+          <a:p>
+            <a:pPr lvl="2"/>
+            <a:r>
+              <a:rPr lang="en-US" dirty="0"/>
+              <a:t>datatype: float, </a:t>
+            </a:r>
+            <a:r>
+              <a:rPr lang="en-US" dirty="0" err="1"/>
+              <a:t>valueSpace</a:t>
+            </a:r>
+            <a:r>
+              <a:rPr lang="en-US" dirty="0"/>
+              <a:t>: [0-1000.0]</a:t>
+            </a:r>
+          </a:p>
+          <a:p>
+            <a:pPr lvl="1"/>
+            <a:r>
+              <a:rPr lang="en-US" dirty="0"/>
+              <a:t>Date: 1267458224</a:t>
+            </a:r>
+          </a:p>
+          <a:p>
+            <a:pPr lvl="2"/>
+            <a:r>
+              <a:rPr lang="en-US" dirty="0"/>
+              <a:t>Datatype: integer, </a:t>
+            </a:r>
+            <a:r>
+              <a:rPr lang="en-US" dirty="0" err="1"/>
+              <a:t>valueSpace</a:t>
+            </a:r>
+            <a:r>
+              <a:rPr lang="en-US" dirty="0"/>
+              <a:t>: 64bit </a:t>
+            </a:r>
+            <a:r>
+              <a:rPr lang="en-US" dirty="0" err="1"/>
+              <a:t>lenght</a:t>
+            </a:r>
+            <a:endParaRPr lang="en-US" dirty="0"/>
+          </a:p>
+          <a:p>
+            <a:pPr lvl="1"/>
+            <a:r>
+              <a:rPr lang="en-US" dirty="0"/>
+              <a:t>Location: </a:t>
+            </a:r>
+            <a:r>
+              <a:rPr lang="en-US" dirty="0" err="1"/>
+              <a:t>lat</a:t>
+            </a:r>
+            <a:r>
+              <a:rPr lang="en-US" dirty="0"/>
+              <a:t>/long/alt</a:t>
+            </a:r>
+          </a:p>
+          <a:p>
+            <a:pPr lvl="2"/>
+            <a:r>
+              <a:rPr lang="en-US" dirty="0"/>
+              <a:t>datatype: dictionary, </a:t>
+            </a:r>
+            <a:r>
+              <a:rPr lang="en-US" dirty="0" err="1"/>
+              <a:t>valueSpace</a:t>
+            </a:r>
+            <a:r>
+              <a:rPr lang="en-US" dirty="0"/>
+              <a:t>: {</a:t>
+            </a:r>
+            <a:r>
+              <a:rPr lang="en-US" dirty="0" err="1"/>
+              <a:t>lat</a:t>
+            </a:r>
+            <a:r>
+              <a:rPr lang="en-US" dirty="0"/>
+              <a:t>:&lt;float64&gt;, long:&lt; float64 &gt;, alt:&lt; float64 &gt;}</a:t>
+            </a:r>
+          </a:p>
+          <a:p>
+            <a:r>
+              <a:rPr lang="en-US" dirty="0"/>
+              <a:t>Functions</a:t>
+            </a:r>
+          </a:p>
+          <a:p>
+            <a:pPr lvl="1"/>
+            <a:r>
+              <a:rPr lang="en-US" dirty="0"/>
+              <a:t>CRUD above data</a:t>
+            </a:r>
+          </a:p>
+          <a:p>
+            <a:pPr lvl="1"/>
+            <a:endParaRPr lang="en-US" dirty="0"/>
+          </a:p>
+          <a:p>
+            <a:pPr lvl="1"/>
+            <a:endParaRPr lang="en-US" dirty="0"/>
+          </a:p>
+        </p:txBody>
+      </p:sp>
+    </p:spTree>
+    <p:extLst>
+      <p:ext uri="{BB962C8B-B14F-4D97-AF65-F5344CB8AC3E}">
+        <p14:creationId xmlns:p14="http://schemas.microsoft.com/office/powerpoint/2010/main" val="2404387097"/>
       </p:ext>
     </p:extLst>
   </p:cSld>

</xml_diff>

<commit_message>
first Entity complete with Data Structure and create() function
</commit_message>
<xml_diff>
--- a/specification/Architecture.pptx
+++ b/specification/Architecture.pptx
@@ -3478,13 +3478,18 @@
           <a:p>
             <a:pPr algn="ctr"/>
             <a:r>
-              <a:rPr lang="en-US" dirty="0">
+              <a:rPr lang="en-US" dirty="0" err="1">
                 <a:solidFill>
                   <a:schemeClr val="tx1"/>
                 </a:solidFill>
               </a:rPr>
-              <a:t>Sensors</a:t>
-            </a:r>
+              <a:t>PMEntity</a:t>
+            </a:r>
+            <a:endParaRPr lang="en-US" dirty="0">
+              <a:solidFill>
+                <a:schemeClr val="tx1"/>
+              </a:solidFill>
+            </a:endParaRPr>
           </a:p>
         </p:txBody>
       </p:sp>

</xml_diff>